<commit_message>
resume builder page 이동
</commit_message>
<xml_diff>
--- a/자료/SK하이닉스_청년희망나눔_Career_Certification_Demo_시나리오_20181227.pptx
+++ b/자료/SK하이닉스_청년희망나눔_Career_Certification_Demo_시나리오_20181227.pptx
@@ -204,7 +204,7 @@
           <a:p>
             <a:fld id="{13E2C4C4-5FC9-473D-99A4-D4975699E713}" type="datetimeFigureOut">
               <a:rPr lang="ko-KR" altLang="en-US" smtClean="0"/>
-              <a:t>2018-12-27</a:t>
+              <a:t>2019. 1. 2.</a:t>
             </a:fld>
             <a:endParaRPr lang="ko-KR" altLang="en-US"/>
           </a:p>
@@ -355,7 +355,7 @@
           <a:p>
             <a:fld id="{861062F6-0310-49D8-A989-D214749561C2}" type="datetimeFigureOut">
               <a:rPr lang="ko-KR" altLang="en-US" smtClean="0"/>
-              <a:t>2018-12-27</a:t>
+              <a:t>2019. 1. 2.</a:t>
             </a:fld>
             <a:endParaRPr lang="ko-KR" altLang="en-US"/>
           </a:p>
@@ -632,7 +632,7 @@
           <a:p>
             <a:fld id="{861062F6-0310-49D8-A989-D214749561C2}" type="datetimeFigureOut">
               <a:rPr lang="ko-KR" altLang="en-US" smtClean="0"/>
-              <a:t>2018-12-27</a:t>
+              <a:t>2019. 1. 2.</a:t>
             </a:fld>
             <a:endParaRPr lang="ko-KR" altLang="en-US"/>
           </a:p>
@@ -889,7 +889,7 @@
           <a:p>
             <a:fld id="{861062F6-0310-49D8-A989-D214749561C2}" type="datetimeFigureOut">
               <a:rPr lang="ko-KR" altLang="en-US" smtClean="0"/>
-              <a:t>2018-12-27</a:t>
+              <a:t>2019. 1. 2.</a:t>
             </a:fld>
             <a:endParaRPr lang="ko-KR" altLang="en-US"/>
           </a:p>
@@ -1059,7 +1059,7 @@
           <a:p>
             <a:fld id="{861062F6-0310-49D8-A989-D214749561C2}" type="datetimeFigureOut">
               <a:rPr lang="ko-KR" altLang="en-US" smtClean="0"/>
-              <a:t>2018-12-27</a:t>
+              <a:t>2019. 1. 2.</a:t>
             </a:fld>
             <a:endParaRPr lang="ko-KR" altLang="en-US"/>
           </a:p>
@@ -1239,7 +1239,7 @@
           <a:p>
             <a:fld id="{861062F6-0310-49D8-A989-D214749561C2}" type="datetimeFigureOut">
               <a:rPr lang="ko-KR" altLang="en-US" smtClean="0"/>
-              <a:t>2018-12-27</a:t>
+              <a:t>2019. 1. 2.</a:t>
             </a:fld>
             <a:endParaRPr lang="ko-KR" altLang="en-US"/>
           </a:p>
@@ -1368,7 +1368,7 @@
           <a:p>
             <a:fld id="{861062F6-0310-49D8-A989-D214749561C2}" type="datetimeFigureOut">
               <a:rPr lang="ko-KR" altLang="en-US" smtClean="0"/>
-              <a:t>2018-12-27</a:t>
+              <a:t>2019. 1. 2.</a:t>
             </a:fld>
             <a:endParaRPr lang="ko-KR" altLang="en-US"/>
           </a:p>
@@ -1616,7 +1616,7 @@
           <a:p>
             <a:fld id="{861062F6-0310-49D8-A989-D214749561C2}" type="datetimeFigureOut">
               <a:rPr lang="ko-KR" altLang="en-US" smtClean="0"/>
-              <a:t>2018-12-27</a:t>
+              <a:t>2019. 1. 2.</a:t>
             </a:fld>
             <a:endParaRPr lang="ko-KR" altLang="en-US"/>
           </a:p>
@@ -1786,7 +1786,7 @@
           <a:p>
             <a:fld id="{861062F6-0310-49D8-A989-D214749561C2}" type="datetimeFigureOut">
               <a:rPr lang="ko-KR" altLang="en-US" smtClean="0"/>
-              <a:t>2018-12-27</a:t>
+              <a:t>2019. 1. 2.</a:t>
             </a:fld>
             <a:endParaRPr lang="ko-KR" altLang="en-US"/>
           </a:p>
@@ -2030,7 +2030,7 @@
           <a:p>
             <a:fld id="{861062F6-0310-49D8-A989-D214749561C2}" type="datetimeFigureOut">
               <a:rPr lang="ko-KR" altLang="en-US" smtClean="0"/>
-              <a:t>2018-12-27</a:t>
+              <a:t>2019. 1. 2.</a:t>
             </a:fld>
             <a:endParaRPr lang="ko-KR" altLang="en-US"/>
           </a:p>
@@ -2262,7 +2262,7 @@
           <a:p>
             <a:fld id="{861062F6-0310-49D8-A989-D214749561C2}" type="datetimeFigureOut">
               <a:rPr lang="ko-KR" altLang="en-US" smtClean="0"/>
-              <a:t>2018-12-27</a:t>
+              <a:t>2019. 1. 2.</a:t>
             </a:fld>
             <a:endParaRPr lang="ko-KR" altLang="en-US"/>
           </a:p>
@@ -2629,7 +2629,7 @@
           <a:p>
             <a:fld id="{861062F6-0310-49D8-A989-D214749561C2}" type="datetimeFigureOut">
               <a:rPr lang="ko-KR" altLang="en-US" smtClean="0"/>
-              <a:t>2018-12-27</a:t>
+              <a:t>2019. 1. 2.</a:t>
             </a:fld>
             <a:endParaRPr lang="ko-KR" altLang="en-US"/>
           </a:p>
@@ -2747,7 +2747,7 @@
           <a:p>
             <a:fld id="{861062F6-0310-49D8-A989-D214749561C2}" type="datetimeFigureOut">
               <a:rPr lang="ko-KR" altLang="en-US" smtClean="0"/>
-              <a:t>2018-12-27</a:t>
+              <a:t>2019. 1. 2.</a:t>
             </a:fld>
             <a:endParaRPr lang="ko-KR" altLang="en-US"/>
           </a:p>
@@ -2842,7 +2842,7 @@
           <a:p>
             <a:fld id="{861062F6-0310-49D8-A989-D214749561C2}" type="datetimeFigureOut">
               <a:rPr lang="ko-KR" altLang="en-US" smtClean="0"/>
-              <a:t>2018-12-27</a:t>
+              <a:t>2019. 1. 2.</a:t>
             </a:fld>
             <a:endParaRPr lang="ko-KR" altLang="en-US"/>
           </a:p>
@@ -3055,7 +3055,7 @@
           <a:p>
             <a:fld id="{861062F6-0310-49D8-A989-D214749561C2}" type="datetimeFigureOut">
               <a:rPr lang="ko-KR" altLang="en-US" smtClean="0"/>
-              <a:t>2018-12-27</a:t>
+              <a:t>2019. 1. 2.</a:t>
             </a:fld>
             <a:endParaRPr lang="ko-KR" altLang="en-US"/>
           </a:p>
@@ -5740,7 +5740,55 @@
                 </a:solidFill>
                 <a:latin typeface="+mn-ea"/>
               </a:rPr>
-              <a:t>채용 예비</a:t>
+              <a:t>채용 </a:t>
+            </a:r>
+            <a:r>
+              <a:rPr lang="ko-KR" altLang="en-US" sz="900" dirty="0" smtClean="0">
+                <a:solidFill>
+                  <a:schemeClr val="tx1">
+                    <a:lumMod val="75000"/>
+                    <a:lumOff val="25000"/>
+                  </a:schemeClr>
+                </a:solidFill>
+                <a:latin typeface="+mn-ea"/>
+              </a:rPr>
+              <a:t>예비</a:t>
+            </a:r>
+            <a:r>
+              <a:rPr lang="en-US" altLang="ko-KR" sz="900" dirty="0" smtClean="0">
+                <a:solidFill>
+                  <a:schemeClr val="tx1">
+                    <a:lumMod val="75000"/>
+                    <a:lumOff val="25000"/>
+                  </a:schemeClr>
+                </a:solidFill>
+                <a:latin typeface="+mn-ea"/>
+              </a:rPr>
+              <a:t>(</a:t>
+            </a:r>
+            <a:r>
+              <a:rPr lang="ko-KR" altLang="en-US" sz="900" smtClean="0">
+                <a:solidFill>
+                  <a:schemeClr val="tx1">
+                    <a:lumMod val="75000"/>
+                    <a:lumOff val="25000"/>
+                  </a:schemeClr>
+                </a:solidFill>
+                <a:latin typeface="+mn-ea"/>
+              </a:rPr>
+              <a:t>버튼</a:t>
+            </a:r>
+            <a:r>
+              <a:rPr lang="en-US" altLang="ko-KR" sz="900" smtClean="0">
+                <a:solidFill>
+                  <a:schemeClr val="tx1">
+                    <a:lumMod val="75000"/>
+                    <a:lumOff val="25000"/>
+                  </a:schemeClr>
+                </a:solidFill>
+                <a:latin typeface="+mn-ea"/>
+              </a:rPr>
+              <a:t>)</a:t>
             </a:r>
             <a:endParaRPr lang="ko-KR" altLang="en-US" sz="900" dirty="0">
               <a:solidFill>
@@ -5803,7 +5851,7 @@
         </p:nvSpPr>
         <p:spPr>
           <a:xfrm>
-            <a:off x="6096000" y="2915094"/>
+            <a:off x="6096000" y="2902455"/>
             <a:ext cx="1003300" cy="694592"/>
           </a:xfrm>
           <a:prstGeom prst="rect">
@@ -5841,42 +5889,6 @@
           <a:lstStyle/>
           <a:p>
             <a:pPr algn="ctr"/>
-            <a:r>
-              <a:rPr lang="ko-KR" altLang="en-US" sz="900" dirty="0" smtClean="0">
-                <a:solidFill>
-                  <a:schemeClr val="tx1">
-                    <a:lumMod val="75000"/>
-                    <a:lumOff val="25000"/>
-                  </a:schemeClr>
-                </a:solidFill>
-                <a:latin typeface="+mn-ea"/>
-              </a:rPr>
-              <a:t>인증 내용</a:t>
-            </a:r>
-            <a:endParaRPr lang="en-US" altLang="ko-KR" sz="900" dirty="0" smtClean="0">
-              <a:solidFill>
-                <a:schemeClr val="tx1">
-                  <a:lumMod val="75000"/>
-                  <a:lumOff val="25000"/>
-                </a:schemeClr>
-              </a:solidFill>
-              <a:latin typeface="+mn-ea"/>
-            </a:endParaRPr>
-          </a:p>
-          <a:p>
-            <a:pPr algn="ctr"/>
-            <a:r>
-              <a:rPr lang="ko-KR" altLang="en-US" sz="900" dirty="0" smtClean="0">
-                <a:solidFill>
-                  <a:schemeClr val="tx1">
-                    <a:lumMod val="75000"/>
-                    <a:lumOff val="25000"/>
-                  </a:schemeClr>
-                </a:solidFill>
-                <a:latin typeface="+mn-ea"/>
-              </a:rPr>
-              <a:t>상세보기</a:t>
-            </a:r>
             <a:endParaRPr lang="ko-KR" altLang="en-US" sz="900" dirty="0">
               <a:solidFill>
                 <a:schemeClr val="tx1">
@@ -5900,8 +5912,8 @@
         </p:nvCxnSpPr>
         <p:spPr>
           <a:xfrm rot="16200000" flipH="1">
-            <a:off x="5236287" y="2402676"/>
-            <a:ext cx="576425" cy="1143001"/>
+            <a:off x="5242606" y="2396357"/>
+            <a:ext cx="563786" cy="1143001"/>
           </a:xfrm>
           <a:prstGeom prst="bentConnector2">
             <a:avLst/>
@@ -5941,7 +5953,7 @@
         </p:nvCxnSpPr>
         <p:spPr>
           <a:xfrm>
-            <a:off x="6597650" y="2696225"/>
+            <a:off x="6597650" y="2683586"/>
             <a:ext cx="0" cy="218869"/>
           </a:xfrm>
           <a:prstGeom prst="straightConnector1">
@@ -6066,7 +6078,7 @@
         <p:spPr>
           <a:xfrm flipV="1">
             <a:off x="7099300" y="1786792"/>
-            <a:ext cx="1149352" cy="1475598"/>
+            <a:ext cx="1149352" cy="1462959"/>
           </a:xfrm>
           <a:prstGeom prst="bentConnector2">
             <a:avLst/>
@@ -6215,18 +6227,6 @@
           <a:lstStyle/>
           <a:p>
             <a:pPr algn="ctr"/>
-            <a:r>
-              <a:rPr lang="ko-KR" altLang="en-US" sz="900" dirty="0" smtClean="0">
-                <a:solidFill>
-                  <a:schemeClr val="tx1">
-                    <a:lumMod val="75000"/>
-                    <a:lumOff val="25000"/>
-                  </a:schemeClr>
-                </a:solidFill>
-                <a:latin typeface="+mn-ea"/>
-              </a:rPr>
-              <a:t>상세보기</a:t>
-            </a:r>
             <a:endParaRPr lang="ko-KR" altLang="en-US" sz="900" dirty="0">
               <a:solidFill>
                 <a:schemeClr val="tx1">
@@ -6365,9 +6365,21 @@
                 </a:solidFill>
                 <a:latin typeface="+mn-ea"/>
               </a:rPr>
-              <a:t>인증 현황 리스트</a:t>
+              <a:t>인증 현황 </a:t>
             </a:r>
-            <a:endParaRPr lang="ko-KR" altLang="en-US" sz="900" dirty="0">
+            <a:r>
+              <a:rPr lang="ko-KR" altLang="en-US" sz="900" dirty="0" smtClean="0">
+                <a:solidFill>
+                  <a:schemeClr val="tx1">
+                    <a:lumMod val="75000"/>
+                    <a:lumOff val="25000"/>
+                  </a:schemeClr>
+                </a:solidFill>
+                <a:latin typeface="+mn-ea"/>
+              </a:rPr>
+              <a:t>리스트</a:t>
+            </a:r>
+            <a:endParaRPr lang="en-US" altLang="ko-KR" sz="900" dirty="0" smtClean="0">
               <a:solidFill>
                 <a:schemeClr val="tx1">
                   <a:lumMod val="75000"/>
@@ -18008,19 +18020,7 @@
                 </a:solidFill>
                 <a:latin typeface="Moebius" panose="02080503040300020004" pitchFamily="18" charset="0"/>
               </a:rPr>
-              <a:t> &gt; </a:t>
-            </a:r>
-            <a:r>
-              <a:rPr lang="en-US" altLang="ko-KR" sz="600" dirty="0" smtClean="0">
-                <a:solidFill>
-                  <a:schemeClr val="tx1">
-                    <a:lumMod val="75000"/>
-                    <a:lumOff val="25000"/>
-                  </a:schemeClr>
-                </a:solidFill>
-                <a:latin typeface="Moebius" panose="02080503040300020004" pitchFamily="18" charset="0"/>
-              </a:rPr>
-              <a:t>Careers</a:t>
+              <a:t> &gt; Careers</a:t>
             </a:r>
             <a:endParaRPr lang="ko-KR" altLang="en-US" sz="600" dirty="0" smtClean="0">
               <a:solidFill>

</xml_diff>

<commit_message>
resume builder page 이동 (#9)
</commit_message>
<xml_diff>
--- a/자료/SK하이닉스_청년희망나눔_Career_Certification_Demo_시나리오_20181227.pptx
+++ b/자료/SK하이닉스_청년희망나눔_Career_Certification_Demo_시나리오_20181227.pptx
@@ -204,7 +204,7 @@
           <a:p>
             <a:fld id="{13E2C4C4-5FC9-473D-99A4-D4975699E713}" type="datetimeFigureOut">
               <a:rPr lang="ko-KR" altLang="en-US" smtClean="0"/>
-              <a:t>2018-12-27</a:t>
+              <a:t>2019. 1. 2.</a:t>
             </a:fld>
             <a:endParaRPr lang="ko-KR" altLang="en-US"/>
           </a:p>
@@ -355,7 +355,7 @@
           <a:p>
             <a:fld id="{861062F6-0310-49D8-A989-D214749561C2}" type="datetimeFigureOut">
               <a:rPr lang="ko-KR" altLang="en-US" smtClean="0"/>
-              <a:t>2018-12-27</a:t>
+              <a:t>2019. 1. 2.</a:t>
             </a:fld>
             <a:endParaRPr lang="ko-KR" altLang="en-US"/>
           </a:p>
@@ -632,7 +632,7 @@
           <a:p>
             <a:fld id="{861062F6-0310-49D8-A989-D214749561C2}" type="datetimeFigureOut">
               <a:rPr lang="ko-KR" altLang="en-US" smtClean="0"/>
-              <a:t>2018-12-27</a:t>
+              <a:t>2019. 1. 2.</a:t>
             </a:fld>
             <a:endParaRPr lang="ko-KR" altLang="en-US"/>
           </a:p>
@@ -889,7 +889,7 @@
           <a:p>
             <a:fld id="{861062F6-0310-49D8-A989-D214749561C2}" type="datetimeFigureOut">
               <a:rPr lang="ko-KR" altLang="en-US" smtClean="0"/>
-              <a:t>2018-12-27</a:t>
+              <a:t>2019. 1. 2.</a:t>
             </a:fld>
             <a:endParaRPr lang="ko-KR" altLang="en-US"/>
           </a:p>
@@ -1059,7 +1059,7 @@
           <a:p>
             <a:fld id="{861062F6-0310-49D8-A989-D214749561C2}" type="datetimeFigureOut">
               <a:rPr lang="ko-KR" altLang="en-US" smtClean="0"/>
-              <a:t>2018-12-27</a:t>
+              <a:t>2019. 1. 2.</a:t>
             </a:fld>
             <a:endParaRPr lang="ko-KR" altLang="en-US"/>
           </a:p>
@@ -1239,7 +1239,7 @@
           <a:p>
             <a:fld id="{861062F6-0310-49D8-A989-D214749561C2}" type="datetimeFigureOut">
               <a:rPr lang="ko-KR" altLang="en-US" smtClean="0"/>
-              <a:t>2018-12-27</a:t>
+              <a:t>2019. 1. 2.</a:t>
             </a:fld>
             <a:endParaRPr lang="ko-KR" altLang="en-US"/>
           </a:p>
@@ -1368,7 +1368,7 @@
           <a:p>
             <a:fld id="{861062F6-0310-49D8-A989-D214749561C2}" type="datetimeFigureOut">
               <a:rPr lang="ko-KR" altLang="en-US" smtClean="0"/>
-              <a:t>2018-12-27</a:t>
+              <a:t>2019. 1. 2.</a:t>
             </a:fld>
             <a:endParaRPr lang="ko-KR" altLang="en-US"/>
           </a:p>
@@ -1616,7 +1616,7 @@
           <a:p>
             <a:fld id="{861062F6-0310-49D8-A989-D214749561C2}" type="datetimeFigureOut">
               <a:rPr lang="ko-KR" altLang="en-US" smtClean="0"/>
-              <a:t>2018-12-27</a:t>
+              <a:t>2019. 1. 2.</a:t>
             </a:fld>
             <a:endParaRPr lang="ko-KR" altLang="en-US"/>
           </a:p>
@@ -1786,7 +1786,7 @@
           <a:p>
             <a:fld id="{861062F6-0310-49D8-A989-D214749561C2}" type="datetimeFigureOut">
               <a:rPr lang="ko-KR" altLang="en-US" smtClean="0"/>
-              <a:t>2018-12-27</a:t>
+              <a:t>2019. 1. 2.</a:t>
             </a:fld>
             <a:endParaRPr lang="ko-KR" altLang="en-US"/>
           </a:p>
@@ -2030,7 +2030,7 @@
           <a:p>
             <a:fld id="{861062F6-0310-49D8-A989-D214749561C2}" type="datetimeFigureOut">
               <a:rPr lang="ko-KR" altLang="en-US" smtClean="0"/>
-              <a:t>2018-12-27</a:t>
+              <a:t>2019. 1. 2.</a:t>
             </a:fld>
             <a:endParaRPr lang="ko-KR" altLang="en-US"/>
           </a:p>
@@ -2262,7 +2262,7 @@
           <a:p>
             <a:fld id="{861062F6-0310-49D8-A989-D214749561C2}" type="datetimeFigureOut">
               <a:rPr lang="ko-KR" altLang="en-US" smtClean="0"/>
-              <a:t>2018-12-27</a:t>
+              <a:t>2019. 1. 2.</a:t>
             </a:fld>
             <a:endParaRPr lang="ko-KR" altLang="en-US"/>
           </a:p>
@@ -2629,7 +2629,7 @@
           <a:p>
             <a:fld id="{861062F6-0310-49D8-A989-D214749561C2}" type="datetimeFigureOut">
               <a:rPr lang="ko-KR" altLang="en-US" smtClean="0"/>
-              <a:t>2018-12-27</a:t>
+              <a:t>2019. 1. 2.</a:t>
             </a:fld>
             <a:endParaRPr lang="ko-KR" altLang="en-US"/>
           </a:p>
@@ -2747,7 +2747,7 @@
           <a:p>
             <a:fld id="{861062F6-0310-49D8-A989-D214749561C2}" type="datetimeFigureOut">
               <a:rPr lang="ko-KR" altLang="en-US" smtClean="0"/>
-              <a:t>2018-12-27</a:t>
+              <a:t>2019. 1. 2.</a:t>
             </a:fld>
             <a:endParaRPr lang="ko-KR" altLang="en-US"/>
           </a:p>
@@ -2842,7 +2842,7 @@
           <a:p>
             <a:fld id="{861062F6-0310-49D8-A989-D214749561C2}" type="datetimeFigureOut">
               <a:rPr lang="ko-KR" altLang="en-US" smtClean="0"/>
-              <a:t>2018-12-27</a:t>
+              <a:t>2019. 1. 2.</a:t>
             </a:fld>
             <a:endParaRPr lang="ko-KR" altLang="en-US"/>
           </a:p>
@@ -3055,7 +3055,7 @@
           <a:p>
             <a:fld id="{861062F6-0310-49D8-A989-D214749561C2}" type="datetimeFigureOut">
               <a:rPr lang="ko-KR" altLang="en-US" smtClean="0"/>
-              <a:t>2018-12-27</a:t>
+              <a:t>2019. 1. 2.</a:t>
             </a:fld>
             <a:endParaRPr lang="ko-KR" altLang="en-US"/>
           </a:p>
@@ -5740,7 +5740,55 @@
                 </a:solidFill>
                 <a:latin typeface="+mn-ea"/>
               </a:rPr>
-              <a:t>채용 예비</a:t>
+              <a:t>채용 </a:t>
+            </a:r>
+            <a:r>
+              <a:rPr lang="ko-KR" altLang="en-US" sz="900" dirty="0" smtClean="0">
+                <a:solidFill>
+                  <a:schemeClr val="tx1">
+                    <a:lumMod val="75000"/>
+                    <a:lumOff val="25000"/>
+                  </a:schemeClr>
+                </a:solidFill>
+                <a:latin typeface="+mn-ea"/>
+              </a:rPr>
+              <a:t>예비</a:t>
+            </a:r>
+            <a:r>
+              <a:rPr lang="en-US" altLang="ko-KR" sz="900" dirty="0" smtClean="0">
+                <a:solidFill>
+                  <a:schemeClr val="tx1">
+                    <a:lumMod val="75000"/>
+                    <a:lumOff val="25000"/>
+                  </a:schemeClr>
+                </a:solidFill>
+                <a:latin typeface="+mn-ea"/>
+              </a:rPr>
+              <a:t>(</a:t>
+            </a:r>
+            <a:r>
+              <a:rPr lang="ko-KR" altLang="en-US" sz="900" smtClean="0">
+                <a:solidFill>
+                  <a:schemeClr val="tx1">
+                    <a:lumMod val="75000"/>
+                    <a:lumOff val="25000"/>
+                  </a:schemeClr>
+                </a:solidFill>
+                <a:latin typeface="+mn-ea"/>
+              </a:rPr>
+              <a:t>버튼</a:t>
+            </a:r>
+            <a:r>
+              <a:rPr lang="en-US" altLang="ko-KR" sz="900" smtClean="0">
+                <a:solidFill>
+                  <a:schemeClr val="tx1">
+                    <a:lumMod val="75000"/>
+                    <a:lumOff val="25000"/>
+                  </a:schemeClr>
+                </a:solidFill>
+                <a:latin typeface="+mn-ea"/>
+              </a:rPr>
+              <a:t>)</a:t>
             </a:r>
             <a:endParaRPr lang="ko-KR" altLang="en-US" sz="900" dirty="0">
               <a:solidFill>
@@ -5803,7 +5851,7 @@
         </p:nvSpPr>
         <p:spPr>
           <a:xfrm>
-            <a:off x="6096000" y="2915094"/>
+            <a:off x="6096000" y="2902455"/>
             <a:ext cx="1003300" cy="694592"/>
           </a:xfrm>
           <a:prstGeom prst="rect">
@@ -5841,42 +5889,6 @@
           <a:lstStyle/>
           <a:p>
             <a:pPr algn="ctr"/>
-            <a:r>
-              <a:rPr lang="ko-KR" altLang="en-US" sz="900" dirty="0" smtClean="0">
-                <a:solidFill>
-                  <a:schemeClr val="tx1">
-                    <a:lumMod val="75000"/>
-                    <a:lumOff val="25000"/>
-                  </a:schemeClr>
-                </a:solidFill>
-                <a:latin typeface="+mn-ea"/>
-              </a:rPr>
-              <a:t>인증 내용</a:t>
-            </a:r>
-            <a:endParaRPr lang="en-US" altLang="ko-KR" sz="900" dirty="0" smtClean="0">
-              <a:solidFill>
-                <a:schemeClr val="tx1">
-                  <a:lumMod val="75000"/>
-                  <a:lumOff val="25000"/>
-                </a:schemeClr>
-              </a:solidFill>
-              <a:latin typeface="+mn-ea"/>
-            </a:endParaRPr>
-          </a:p>
-          <a:p>
-            <a:pPr algn="ctr"/>
-            <a:r>
-              <a:rPr lang="ko-KR" altLang="en-US" sz="900" dirty="0" smtClean="0">
-                <a:solidFill>
-                  <a:schemeClr val="tx1">
-                    <a:lumMod val="75000"/>
-                    <a:lumOff val="25000"/>
-                  </a:schemeClr>
-                </a:solidFill>
-                <a:latin typeface="+mn-ea"/>
-              </a:rPr>
-              <a:t>상세보기</a:t>
-            </a:r>
             <a:endParaRPr lang="ko-KR" altLang="en-US" sz="900" dirty="0">
               <a:solidFill>
                 <a:schemeClr val="tx1">
@@ -5900,8 +5912,8 @@
         </p:nvCxnSpPr>
         <p:spPr>
           <a:xfrm rot="16200000" flipH="1">
-            <a:off x="5236287" y="2402676"/>
-            <a:ext cx="576425" cy="1143001"/>
+            <a:off x="5242606" y="2396357"/>
+            <a:ext cx="563786" cy="1143001"/>
           </a:xfrm>
           <a:prstGeom prst="bentConnector2">
             <a:avLst/>
@@ -5941,7 +5953,7 @@
         </p:nvCxnSpPr>
         <p:spPr>
           <a:xfrm>
-            <a:off x="6597650" y="2696225"/>
+            <a:off x="6597650" y="2683586"/>
             <a:ext cx="0" cy="218869"/>
           </a:xfrm>
           <a:prstGeom prst="straightConnector1">
@@ -6066,7 +6078,7 @@
         <p:spPr>
           <a:xfrm flipV="1">
             <a:off x="7099300" y="1786792"/>
-            <a:ext cx="1149352" cy="1475598"/>
+            <a:ext cx="1149352" cy="1462959"/>
           </a:xfrm>
           <a:prstGeom prst="bentConnector2">
             <a:avLst/>
@@ -6215,18 +6227,6 @@
           <a:lstStyle/>
           <a:p>
             <a:pPr algn="ctr"/>
-            <a:r>
-              <a:rPr lang="ko-KR" altLang="en-US" sz="900" dirty="0" smtClean="0">
-                <a:solidFill>
-                  <a:schemeClr val="tx1">
-                    <a:lumMod val="75000"/>
-                    <a:lumOff val="25000"/>
-                  </a:schemeClr>
-                </a:solidFill>
-                <a:latin typeface="+mn-ea"/>
-              </a:rPr>
-              <a:t>상세보기</a:t>
-            </a:r>
             <a:endParaRPr lang="ko-KR" altLang="en-US" sz="900" dirty="0">
               <a:solidFill>
                 <a:schemeClr val="tx1">
@@ -6365,9 +6365,21 @@
                 </a:solidFill>
                 <a:latin typeface="+mn-ea"/>
               </a:rPr>
-              <a:t>인증 현황 리스트</a:t>
+              <a:t>인증 현황 </a:t>
             </a:r>
-            <a:endParaRPr lang="ko-KR" altLang="en-US" sz="900" dirty="0">
+            <a:r>
+              <a:rPr lang="ko-KR" altLang="en-US" sz="900" dirty="0" smtClean="0">
+                <a:solidFill>
+                  <a:schemeClr val="tx1">
+                    <a:lumMod val="75000"/>
+                    <a:lumOff val="25000"/>
+                  </a:schemeClr>
+                </a:solidFill>
+                <a:latin typeface="+mn-ea"/>
+              </a:rPr>
+              <a:t>리스트</a:t>
+            </a:r>
+            <a:endParaRPr lang="en-US" altLang="ko-KR" sz="900" dirty="0" smtClean="0">
               <a:solidFill>
                 <a:schemeClr val="tx1">
                   <a:lumMod val="75000"/>
@@ -18008,19 +18020,7 @@
                 </a:solidFill>
                 <a:latin typeface="Moebius" panose="02080503040300020004" pitchFamily="18" charset="0"/>
               </a:rPr>
-              <a:t> &gt; </a:t>
-            </a:r>
-            <a:r>
-              <a:rPr lang="en-US" altLang="ko-KR" sz="600" dirty="0" smtClean="0">
-                <a:solidFill>
-                  <a:schemeClr val="tx1">
-                    <a:lumMod val="75000"/>
-                    <a:lumOff val="25000"/>
-                  </a:schemeClr>
-                </a:solidFill>
-                <a:latin typeface="Moebius" panose="02080503040300020004" pitchFamily="18" charset="0"/>
-              </a:rPr>
-              <a:t>Careers</a:t>
+              <a:t> &gt; Careers</a:t>
             </a:r>
             <a:endParaRPr lang="ko-KR" altLang="en-US" sz="600" dirty="0" smtClean="0">
               <a:solidFill>

</xml_diff>